<commit_message>
Added Command set file
</commit_message>
<xml_diff>
--- a/TH/THPresentation.pptx
+++ b/TH/THPresentation.pptx
@@ -207,7 +207,7 @@
           <a:p>
             <a:fld id="{967E2C36-C3CF-6B4C-9C3F-E15C53590346}" type="datetimeFigureOut">
               <a:rPr lang="en-US" smtClean="0"/>
-              <a:t>11/17/14</a:t>
+              <a:t>11/18/14</a:t>
             </a:fld>
             <a:endParaRPr lang="en-US"/>
           </a:p>
@@ -373,7 +373,7 @@
           <a:p>
             <a:fld id="{EB84B806-C2E6-2440-A616-F42D8A764A1A}" type="datetimeFigureOut">
               <a:rPr lang="en-US" smtClean="0"/>
-              <a:t>11/17/14</a:t>
+              <a:t>11/18/14</a:t>
             </a:fld>
             <a:endParaRPr lang="en-US"/>
           </a:p>
@@ -823,7 +823,7 @@
           <a:p>
             <a:fld id="{92B32B24-6D62-9441-8EA8-A3A98EB72276}" type="datetime1">
               <a:rPr lang="en-US" smtClean="0"/>
-              <a:t>11/17/14</a:t>
+              <a:t>11/18/14</a:t>
             </a:fld>
             <a:endParaRPr lang="en-US"/>
           </a:p>
@@ -997,7 +997,7 @@
           <a:p>
             <a:fld id="{A467CE1F-2550-234D-9DEA-083C43A2F525}" type="datetime1">
               <a:rPr lang="en-US" smtClean="0"/>
-              <a:t>11/17/14</a:t>
+              <a:t>11/18/14</a:t>
             </a:fld>
             <a:endParaRPr lang="en-US"/>
           </a:p>
@@ -1181,7 +1181,7 @@
           <a:p>
             <a:fld id="{259D31D5-D974-414B-B05D-E1E3C210C4A8}" type="datetime1">
               <a:rPr lang="en-US" smtClean="0"/>
-              <a:t>11/17/14</a:t>
+              <a:t>11/18/14</a:t>
             </a:fld>
             <a:endParaRPr lang="en-US"/>
           </a:p>
@@ -1355,7 +1355,7 @@
           <a:p>
             <a:fld id="{8CE50046-E3C2-874B-B431-A1831E0D300F}" type="datetime1">
               <a:rPr lang="en-US" smtClean="0"/>
-              <a:t>11/17/14</a:t>
+              <a:t>11/18/14</a:t>
             </a:fld>
             <a:endParaRPr lang="en-US"/>
           </a:p>
@@ -1605,7 +1605,7 @@
           <a:p>
             <a:fld id="{EB7E079A-5B39-EA4B-9F45-17DFB8CB53E6}" type="datetime1">
               <a:rPr lang="en-US" smtClean="0"/>
-              <a:t>11/17/14</a:t>
+              <a:t>11/18/14</a:t>
             </a:fld>
             <a:endParaRPr lang="en-US"/>
           </a:p>
@@ -1897,7 +1897,7 @@
           <a:p>
             <a:fld id="{9570D4C2-0C6A-9C48-B5F9-C3C4D299CA89}" type="datetime1">
               <a:rPr lang="en-US" smtClean="0"/>
-              <a:t>11/17/14</a:t>
+              <a:t>11/18/14</a:t>
             </a:fld>
             <a:endParaRPr lang="en-US"/>
           </a:p>
@@ -2323,7 +2323,7 @@
           <a:p>
             <a:fld id="{67585C98-CAD4-B24F-A6CA-886EE830C197}" type="datetime1">
               <a:rPr lang="en-US" smtClean="0"/>
-              <a:t>11/17/14</a:t>
+              <a:t>11/18/14</a:t>
             </a:fld>
             <a:endParaRPr lang="en-US"/>
           </a:p>
@@ -2445,7 +2445,7 @@
           <a:p>
             <a:fld id="{16EEF763-D8AF-8C4C-BFD0-3024212D45BD}" type="datetime1">
               <a:rPr lang="en-US" smtClean="0"/>
-              <a:t>11/17/14</a:t>
+              <a:t>11/18/14</a:t>
             </a:fld>
             <a:endParaRPr lang="en-US"/>
           </a:p>
@@ -2544,7 +2544,7 @@
           <a:p>
             <a:fld id="{14573AF7-5499-6349-8A5A-C3D678CD8B5B}" type="datetime1">
               <a:rPr lang="en-US" smtClean="0"/>
-              <a:t>11/17/14</a:t>
+              <a:t>11/18/14</a:t>
             </a:fld>
             <a:endParaRPr lang="en-US"/>
           </a:p>
@@ -2825,7 +2825,7 @@
           <a:p>
             <a:fld id="{9A77A4B8-BEDC-CA49-BFFD-94F5863C7358}" type="datetime1">
               <a:rPr lang="en-US" smtClean="0"/>
-              <a:t>11/17/14</a:t>
+              <a:t>11/18/14</a:t>
             </a:fld>
             <a:endParaRPr lang="en-US"/>
           </a:p>
@@ -3082,7 +3082,7 @@
           <a:p>
             <a:fld id="{44C42B9A-78A9-CF4D-B62B-3D5FBA23DB00}" type="datetime1">
               <a:rPr lang="en-US" smtClean="0"/>
-              <a:t>11/17/14</a:t>
+              <a:t>11/18/14</a:t>
             </a:fld>
             <a:endParaRPr lang="en-US"/>
           </a:p>
@@ -3299,7 +3299,7 @@
           <a:p>
             <a:fld id="{9BCA596E-38F2-D847-A200-9CC9FBA0DCAE}" type="datetime1">
               <a:rPr lang="en-US" smtClean="0"/>
-              <a:t>11/17/14</a:t>
+              <a:t>11/18/14</a:t>
             </a:fld>
             <a:endParaRPr lang="en-US"/>
           </a:p>
@@ -4002,7 +4002,6 @@
               <a:rPr lang="en-US" dirty="0" smtClean="0"/>
               <a:t>[|expression|]</a:t>
             </a:r>
-            <a:endParaRPr lang="en-US" dirty="0" smtClean="0"/>
           </a:p>
           <a:p>
             <a:r>
@@ -4042,11 +4041,7 @@
             <a:pPr lvl="1"/>
             <a:r>
               <a:rPr lang="en-US" dirty="0" smtClean="0"/>
-              <a:t>To g</a:t>
-            </a:r>
-            <a:r>
-              <a:rPr lang="en-US" dirty="0" smtClean="0"/>
-              <a:t>enerate type values [</a:t>
+              <a:t>To generate type values [</a:t>
             </a:r>
             <a:r>
               <a:rPr lang="en-US" dirty="0" err="1" smtClean="0"/>
@@ -4077,7 +4072,6 @@
               <a:rPr lang="en-US" dirty="0" smtClean="0"/>
               <a:t>)|]</a:t>
             </a:r>
-            <a:endParaRPr lang="en-US" dirty="0" smtClean="0"/>
           </a:p>
           <a:p>
             <a:r>
@@ -4190,13 +4184,7 @@
               <a:rPr lang="en-US" dirty="0" smtClean="0">
                 <a:hlinkClick r:id="rId2"/>
               </a:rPr>
-              <a:t>”allows programmers to use domain spe</a:t>
-            </a:r>
-            <a:r>
-              <a:rPr lang="en-US" dirty="0" smtClean="0">
-                <a:hlinkClick r:id="rId2"/>
-              </a:rPr>
-              <a:t>cific syntax to construct program fragments”</a:t>
+              <a:t>”allows programmers to use domain specific syntax to construct program fragments”</a:t>
             </a:r>
             <a:endParaRPr lang="en-US" dirty="0" smtClean="0"/>
           </a:p>
@@ -4323,8 +4311,8 @@
           <a:lstStyle/>
           <a:p>
             <a:r>
-              <a:rPr lang="en-US" dirty="0" err="1" smtClean="0"/>
-              <a:t>Liks</a:t>
+              <a:rPr lang="en-US" dirty="0" smtClean="0"/>
+              <a:t>Links</a:t>
             </a:r>
             <a:endParaRPr lang="en-US" dirty="0"/>
           </a:p>
@@ -4589,8 +4577,17 @@
             </a:r>
             <a:r>
               <a:rPr lang="en-US" dirty="0" smtClean="0"/>
-              <a:t>-splices” dumps the generated code.</a:t>
-            </a:r>
+              <a:t>-splices” dumps the generated </a:t>
+            </a:r>
+            <a:r>
+              <a:rPr lang="en-US" smtClean="0"/>
+              <a:t>code</a:t>
+            </a:r>
+            <a:r>
+              <a:rPr lang="en-US" smtClean="0"/>
+              <a:t>.</a:t>
+            </a:r>
+            <a:endParaRPr lang="en-US" dirty="0" smtClean="0"/>
           </a:p>
         </p:txBody>
       </p:sp>

</xml_diff>

<commit_message>
Added QQ sample files
</commit_message>
<xml_diff>
--- a/TH/THPresentation.pptx
+++ b/TH/THPresentation.pptx
@@ -5,10 +5,10 @@
     <p:sldMasterId id="2147483648" r:id="rId1"/>
   </p:sldMasterIdLst>
   <p:notesMasterIdLst>
-    <p:notesMasterId r:id="rId15"/>
+    <p:notesMasterId r:id="rId16"/>
   </p:notesMasterIdLst>
   <p:handoutMasterIdLst>
-    <p:handoutMasterId r:id="rId16"/>
+    <p:handoutMasterId r:id="rId17"/>
   </p:handoutMasterIdLst>
   <p:sldIdLst>
     <p:sldId id="256" r:id="rId2"/>
@@ -23,7 +23,8 @@
     <p:sldId id="268" r:id="rId11"/>
     <p:sldId id="271" r:id="rId12"/>
     <p:sldId id="269" r:id="rId13"/>
-    <p:sldId id="264" r:id="rId14"/>
+    <p:sldId id="272" r:id="rId14"/>
+    <p:sldId id="264" r:id="rId15"/>
   </p:sldIdLst>
   <p:sldSz cx="9144000" cy="6858000" type="screen4x3"/>
   <p:notesSz cx="6858000" cy="9144000"/>
@@ -207,7 +208,7 @@
           <a:p>
             <a:fld id="{967E2C36-C3CF-6B4C-9C3F-E15C53590346}" type="datetimeFigureOut">
               <a:rPr lang="en-US" smtClean="0"/>
-              <a:t>11/18/14</a:t>
+              <a:t>11/19/14</a:t>
             </a:fld>
             <a:endParaRPr lang="en-US"/>
           </a:p>
@@ -373,7 +374,7 @@
           <a:p>
             <a:fld id="{EB84B806-C2E6-2440-A616-F42D8A764A1A}" type="datetimeFigureOut">
               <a:rPr lang="en-US" smtClean="0"/>
-              <a:t>11/18/14</a:t>
+              <a:t>11/19/14</a:t>
             </a:fld>
             <a:endParaRPr lang="en-US"/>
           </a:p>
@@ -823,7 +824,7 @@
           <a:p>
             <a:fld id="{92B32B24-6D62-9441-8EA8-A3A98EB72276}" type="datetime1">
               <a:rPr lang="en-US" smtClean="0"/>
-              <a:t>11/18/14</a:t>
+              <a:t>11/19/14</a:t>
             </a:fld>
             <a:endParaRPr lang="en-US"/>
           </a:p>
@@ -997,7 +998,7 @@
           <a:p>
             <a:fld id="{A467CE1F-2550-234D-9DEA-083C43A2F525}" type="datetime1">
               <a:rPr lang="en-US" smtClean="0"/>
-              <a:t>11/18/14</a:t>
+              <a:t>11/19/14</a:t>
             </a:fld>
             <a:endParaRPr lang="en-US"/>
           </a:p>
@@ -1181,7 +1182,7 @@
           <a:p>
             <a:fld id="{259D31D5-D974-414B-B05D-E1E3C210C4A8}" type="datetime1">
               <a:rPr lang="en-US" smtClean="0"/>
-              <a:t>11/18/14</a:t>
+              <a:t>11/19/14</a:t>
             </a:fld>
             <a:endParaRPr lang="en-US"/>
           </a:p>
@@ -1355,7 +1356,7 @@
           <a:p>
             <a:fld id="{8CE50046-E3C2-874B-B431-A1831E0D300F}" type="datetime1">
               <a:rPr lang="en-US" smtClean="0"/>
-              <a:t>11/18/14</a:t>
+              <a:t>11/19/14</a:t>
             </a:fld>
             <a:endParaRPr lang="en-US"/>
           </a:p>
@@ -1605,7 +1606,7 @@
           <a:p>
             <a:fld id="{EB7E079A-5B39-EA4B-9F45-17DFB8CB53E6}" type="datetime1">
               <a:rPr lang="en-US" smtClean="0"/>
-              <a:t>11/18/14</a:t>
+              <a:t>11/19/14</a:t>
             </a:fld>
             <a:endParaRPr lang="en-US"/>
           </a:p>
@@ -1897,7 +1898,7 @@
           <a:p>
             <a:fld id="{9570D4C2-0C6A-9C48-B5F9-C3C4D299CA89}" type="datetime1">
               <a:rPr lang="en-US" smtClean="0"/>
-              <a:t>11/18/14</a:t>
+              <a:t>11/19/14</a:t>
             </a:fld>
             <a:endParaRPr lang="en-US"/>
           </a:p>
@@ -2323,7 +2324,7 @@
           <a:p>
             <a:fld id="{67585C98-CAD4-B24F-A6CA-886EE830C197}" type="datetime1">
               <a:rPr lang="en-US" smtClean="0"/>
-              <a:t>11/18/14</a:t>
+              <a:t>11/19/14</a:t>
             </a:fld>
             <a:endParaRPr lang="en-US"/>
           </a:p>
@@ -2445,7 +2446,7 @@
           <a:p>
             <a:fld id="{16EEF763-D8AF-8C4C-BFD0-3024212D45BD}" type="datetime1">
               <a:rPr lang="en-US" smtClean="0"/>
-              <a:t>11/18/14</a:t>
+              <a:t>11/19/14</a:t>
             </a:fld>
             <a:endParaRPr lang="en-US"/>
           </a:p>
@@ -2544,7 +2545,7 @@
           <a:p>
             <a:fld id="{14573AF7-5499-6349-8A5A-C3D678CD8B5B}" type="datetime1">
               <a:rPr lang="en-US" smtClean="0"/>
-              <a:t>11/18/14</a:t>
+              <a:t>11/19/14</a:t>
             </a:fld>
             <a:endParaRPr lang="en-US"/>
           </a:p>
@@ -2825,7 +2826,7 @@
           <a:p>
             <a:fld id="{9A77A4B8-BEDC-CA49-BFFD-94F5863C7358}" type="datetime1">
               <a:rPr lang="en-US" smtClean="0"/>
-              <a:t>11/18/14</a:t>
+              <a:t>11/19/14</a:t>
             </a:fld>
             <a:endParaRPr lang="en-US"/>
           </a:p>
@@ -3082,7 +3083,7 @@
           <a:p>
             <a:fld id="{44C42B9A-78A9-CF4D-B62B-3D5FBA23DB00}" type="datetime1">
               <a:rPr lang="en-US" smtClean="0"/>
-              <a:t>11/18/14</a:t>
+              <a:t>11/19/14</a:t>
             </a:fld>
             <a:endParaRPr lang="en-US"/>
           </a:p>
@@ -3299,7 +3300,7 @@
           <a:p>
             <a:fld id="{9BCA596E-38F2-D847-A200-9CC9FBA0DCAE}" type="datetime1">
               <a:rPr lang="en-US" smtClean="0"/>
-              <a:t>11/18/14</a:t>
+              <a:t>11/19/14</a:t>
             </a:fld>
             <a:endParaRPr lang="en-US"/>
           </a:p>
@@ -3929,6 +3930,13 @@
   <p:clrMapOvr>
     <a:masterClrMapping/>
   </p:clrMapOvr>
+  <p:timing>
+    <p:tnLst>
+      <p:par>
+        <p:cTn xmlns:p14="http://schemas.microsoft.com/office/powerpoint/2010/main" id="1" dur="indefinite" restart="never" nodeType="tmRoot"/>
+      </p:par>
+    </p:tnLst>
+  </p:timing>
 </p:sld>
 </file>
 
@@ -4122,6 +4130,13 @@
   <p:clrMapOvr>
     <a:masterClrMapping/>
   </p:clrMapOvr>
+  <p:timing>
+    <p:tnLst>
+      <p:par>
+        <p:cTn xmlns:p14="http://schemas.microsoft.com/office/powerpoint/2010/main" id="1" dur="indefinite" restart="never" nodeType="tmRoot"/>
+      </p:par>
+    </p:tnLst>
+  </p:timing>
 </p:sld>
 </file>
 
@@ -4197,8 +4212,15 @@
           <a:p>
             <a:r>
               <a:rPr lang="en-US" dirty="0" smtClean="0"/>
-              <a:t>Similar to TH is a language extension –</a:t>
-            </a:r>
+              <a:t>Similar to TH is a language </a:t>
+            </a:r>
+            <a:r>
+              <a:rPr lang="en-US" dirty="0" smtClean="0"/>
+              <a:t>extension</a:t>
+            </a:r>
+          </a:p>
+          <a:p>
+            <a:pPr lvl="1"/>
             <a:r>
               <a:rPr lang="en-US" dirty="0" err="1" smtClean="0"/>
               <a:t>XQuasiQuotes</a:t>
@@ -4273,6 +4295,13 @@
   <p:clrMapOvr>
     <a:masterClrMapping/>
   </p:clrMapOvr>
+  <p:timing>
+    <p:tnLst>
+      <p:par>
+        <p:cTn xmlns:p14="http://schemas.microsoft.com/office/powerpoint/2010/main" id="1" dur="indefinite" restart="never" nodeType="tmRoot"/>
+      </p:par>
+    </p:tnLst>
+  </p:timing>
 </p:sld>
 </file>
 
@@ -4311,6 +4340,143 @@
           <a:lstStyle/>
           <a:p>
             <a:r>
+              <a:rPr lang="en-US" dirty="0" err="1" smtClean="0"/>
+              <a:t>QuasiQuoters</a:t>
+            </a:r>
+            <a:endParaRPr lang="en-US" dirty="0"/>
+          </a:p>
+        </p:txBody>
+      </p:sp>
+      <p:sp>
+        <p:nvSpPr>
+          <p:cNvPr id="3" name="Content Placeholder 2"/>
+          <p:cNvSpPr>
+            <a:spLocks noGrp="1"/>
+          </p:cNvSpPr>
+          <p:nvPr>
+            <p:ph idx="1"/>
+          </p:nvPr>
+        </p:nvSpPr>
+        <p:spPr/>
+        <p:txBody>
+          <a:bodyPr/>
+          <a:lstStyle/>
+          <a:p>
+            <a:r>
+              <a:rPr lang="en-US" dirty="0" smtClean="0"/>
+              <a:t>Functions that take a string and return Q a</a:t>
+            </a:r>
+          </a:p>
+          <a:p>
+            <a:r>
+              <a:rPr lang="en-US" dirty="0" smtClean="0"/>
+              <a:t>Basically parsers that return Q a</a:t>
+            </a:r>
+          </a:p>
+          <a:p>
+            <a:r>
+              <a:rPr lang="en-US" dirty="0" smtClean="0">
+                <a:hlinkClick r:id="rId2"/>
+              </a:rPr>
+              <a:t>QuasiQuoter</a:t>
+            </a:r>
+            <a:r>
+              <a:rPr lang="en-US" dirty="0" smtClean="0"/>
+              <a:t> is a data type.</a:t>
+            </a:r>
+          </a:p>
+          <a:p>
+            <a:r>
+              <a:rPr lang="en-US" dirty="0" smtClean="0">
+                <a:hlinkClick r:id="rId3"/>
+              </a:rPr>
+              <a:t>Sample</a:t>
+            </a:r>
+            <a:endParaRPr lang="en-US" dirty="0" smtClean="0"/>
+          </a:p>
+          <a:p>
+            <a:endParaRPr lang="en-US" dirty="0" smtClean="0"/>
+          </a:p>
+        </p:txBody>
+      </p:sp>
+      <p:sp>
+        <p:nvSpPr>
+          <p:cNvPr id="4" name="Footer Placeholder 3"/>
+          <p:cNvSpPr>
+            <a:spLocks noGrp="1"/>
+          </p:cNvSpPr>
+          <p:nvPr>
+            <p:ph type="ftr" sz="quarter" idx="11"/>
+          </p:nvPr>
+        </p:nvSpPr>
+        <p:spPr/>
+        <p:txBody>
+          <a:bodyPr/>
+          <a:lstStyle/>
+          <a:p>
+            <a:r>
+              <a:rPr lang="en-US" smtClean="0"/>
+              <a:t>San Diego Haskell User Group</a:t>
+            </a:r>
+            <a:endParaRPr lang="en-US" dirty="0"/>
+          </a:p>
+        </p:txBody>
+      </p:sp>
+    </p:spTree>
+    <p:extLst>
+      <p:ext uri="{BB962C8B-B14F-4D97-AF65-F5344CB8AC3E}">
+        <p14:creationId xmlns:p14="http://schemas.microsoft.com/office/powerpoint/2010/main" val="701300643"/>
+      </p:ext>
+    </p:extLst>
+  </p:cSld>
+  <p:clrMapOvr>
+    <a:masterClrMapping/>
+  </p:clrMapOvr>
+  <p:timing>
+    <p:tnLst>
+      <p:par>
+        <p:cTn xmlns:p14="http://schemas.microsoft.com/office/powerpoint/2010/main" id="1" dur="indefinite" restart="never" nodeType="tmRoot"/>
+      </p:par>
+    </p:tnLst>
+  </p:timing>
+</p:sld>
+</file>
+
+<file path=ppt/slides/slide14.xml><?xml version="1.0" encoding="utf-8"?>
+<p:sld xmlns:a="http://schemas.openxmlformats.org/drawingml/2006/main" xmlns:r="http://schemas.openxmlformats.org/officeDocument/2006/relationships" xmlns:p="http://schemas.openxmlformats.org/presentationml/2006/main">
+  <p:cSld>
+    <p:spTree>
+      <p:nvGrpSpPr>
+        <p:cNvPr id="1" name=""/>
+        <p:cNvGrpSpPr/>
+        <p:nvPr/>
+      </p:nvGrpSpPr>
+      <p:grpSpPr>
+        <a:xfrm>
+          <a:off x="0" y="0"/>
+          <a:ext cx="0" cy="0"/>
+          <a:chOff x="0" y="0"/>
+          <a:chExt cx="0" cy="0"/>
+        </a:xfrm>
+      </p:grpSpPr>
+      <p:sp>
+        <p:nvSpPr>
+          <p:cNvPr id="2" name="Title 1"/>
+          <p:cNvSpPr>
+            <a:spLocks noGrp="1"/>
+          </p:cNvSpPr>
+          <p:nvPr>
+            <p:ph type="title"/>
+          </p:nvPr>
+        </p:nvSpPr>
+        <p:spPr/>
+        <p:txBody>
+          <a:bodyPr>
+            <a:normAutofit/>
+          </a:bodyPr>
+          <a:lstStyle/>
+          <a:p>
+            <a:r>
               <a:rPr lang="en-US" dirty="0" smtClean="0"/>
               <a:t>Links</a:t>
             </a:r>
@@ -4373,13 +4539,7 @@
               <a:rPr lang="en-US" dirty="0" smtClean="0">
                 <a:hlinkClick r:id="rId6"/>
               </a:rPr>
-              <a:t>A look at </a:t>
-            </a:r>
-            <a:r>
-              <a:rPr lang="en-US" dirty="0" err="1" smtClean="0">
-                <a:hlinkClick r:id="rId6"/>
-              </a:rPr>
-              <a:t>QuasiQuotation</a:t>
+              <a:t>A look at QuasiQuotation</a:t>
             </a:r>
             <a:endParaRPr lang="en-US" dirty="0"/>
           </a:p>
@@ -4418,6 +4578,13 @@
   <p:clrMapOvr>
     <a:masterClrMapping/>
   </p:clrMapOvr>
+  <p:timing>
+    <p:tnLst>
+      <p:par>
+        <p:cTn xmlns:p14="http://schemas.microsoft.com/office/powerpoint/2010/main" id="1" dur="indefinite" restart="never" nodeType="tmRoot"/>
+      </p:par>
+    </p:tnLst>
+  </p:timing>
 </p:sld>
 </file>
 
@@ -4581,11 +4748,7 @@
             </a:r>
             <a:r>
               <a:rPr lang="en-US" smtClean="0"/>
-              <a:t>code</a:t>
-            </a:r>
-            <a:r>
-              <a:rPr lang="en-US" smtClean="0"/>
-              <a:t>.</a:t>
+              <a:t>code.</a:t>
             </a:r>
             <a:endParaRPr lang="en-US" dirty="0" smtClean="0"/>
           </a:p>
@@ -5326,8 +5489,21 @@
           <a:p>
             <a:r>
               <a:rPr lang="en-US" dirty="0" smtClean="0"/>
-              <a:t>[|…|] accepts a string and converts it to (Q a)</a:t>
-            </a:r>
+              <a:t>[|…|] accepts a string and converts it to (Q a</a:t>
+            </a:r>
+            <a:r>
+              <a:rPr lang="en-US" dirty="0" smtClean="0"/>
+              <a:t>) (Lifts it into Q </a:t>
+            </a:r>
+            <a:r>
+              <a:rPr lang="en-US" dirty="0" err="1" smtClean="0"/>
+              <a:t>Exp</a:t>
+            </a:r>
+            <a:r>
+              <a:rPr lang="en-US" dirty="0" smtClean="0"/>
+              <a:t>)</a:t>
+            </a:r>
+            <a:endParaRPr lang="en-US" dirty="0" smtClean="0"/>
           </a:p>
           <a:p>
             <a:r>
@@ -5606,6 +5782,13 @@
   <p:clrMapOvr>
     <a:masterClrMapping/>
   </p:clrMapOvr>
+  <p:timing>
+    <p:tnLst>
+      <p:par>
+        <p:cTn xmlns:p14="http://schemas.microsoft.com/office/powerpoint/2010/main" id="1" dur="indefinite" restart="never" nodeType="tmRoot"/>
+      </p:par>
+    </p:tnLst>
+  </p:timing>
 </p:sld>
 </file>
 
@@ -5775,6 +5958,13 @@
   <p:clrMapOvr>
     <a:masterClrMapping/>
   </p:clrMapOvr>
+  <p:timing>
+    <p:tnLst>
+      <p:par>
+        <p:cTn xmlns:p14="http://schemas.microsoft.com/office/powerpoint/2010/main" id="1" dur="indefinite" restart="never" nodeType="tmRoot"/>
+      </p:par>
+    </p:tnLst>
+  </p:timing>
 </p:sld>
 </file>
 
@@ -5971,6 +6161,13 @@
   <p:clrMapOvr>
     <a:masterClrMapping/>
   </p:clrMapOvr>
+  <p:timing>
+    <p:tnLst>
+      <p:par>
+        <p:cTn xmlns:p14="http://schemas.microsoft.com/office/powerpoint/2010/main" id="1" dur="indefinite" restart="never" nodeType="tmRoot"/>
+      </p:par>
+    </p:tnLst>
+  </p:timing>
 </p:sld>
 </file>
 

</xml_diff>